<commit_message>
changed inside the file
</commit_message>
<xml_diff>
--- a/Week2/2.2 Introduction to Pandas.pptx
+++ b/Week2/2.2 Introduction to Pandas.pptx
@@ -913,7 +913,7 @@
           <a:p>
             <a:fld id="{C9A5CDD8-A097-434C-89F7-7DEC049F05DB}" type="datetimeFigureOut">
               <a:rPr lang="en-US" smtClean="0"/>
-              <a:t>8/21/2021</a:t>
+              <a:t>8/25/21</a:t>
             </a:fld>
             <a:endParaRPr lang="en-US"/>
           </a:p>
@@ -1393,7 +1393,7 @@
           <a:p>
             <a:fld id="{EDDD9450-3411-46C3-A295-C3C8A24CDDD1}" type="datetime1">
               <a:rPr lang="en-US" smtClean="0"/>
-              <a:t>8/21/2021</a:t>
+              <a:t>8/25/21</a:t>
             </a:fld>
             <a:endParaRPr lang="en-US"/>
           </a:p>
@@ -1561,7 +1561,7 @@
           <a:p>
             <a:fld id="{20E146ED-4978-4AE1-A0AC-814F1A25EB57}" type="datetime1">
               <a:rPr lang="en-US" smtClean="0"/>
-              <a:t>8/21/2021</a:t>
+              <a:t>8/25/21</a:t>
             </a:fld>
             <a:endParaRPr lang="en-US"/>
           </a:p>
@@ -1739,7 +1739,7 @@
           <a:p>
             <a:fld id="{9BBE0FC5-4E33-4973-A6A9-5E6A71F63279}" type="datetime1">
               <a:rPr lang="en-US" smtClean="0"/>
-              <a:t>8/21/2021</a:t>
+              <a:t>8/25/21</a:t>
             </a:fld>
             <a:endParaRPr lang="en-US"/>
           </a:p>
@@ -1949,7 +1949,7 @@
           <a:p>
             <a:fld id="{34D9D31F-308E-4939-ADC5-C108937F9441}" type="datetime1">
               <a:rPr lang="en-US" smtClean="0"/>
-              <a:t>8/21/2021</a:t>
+              <a:t>8/25/21</a:t>
             </a:fld>
             <a:endParaRPr lang="en-US"/>
           </a:p>
@@ -2194,7 +2194,7 @@
           <a:p>
             <a:fld id="{F4F98F23-943A-4119-9144-1B0B824641F4}" type="datetime1">
               <a:rPr lang="en-US" smtClean="0"/>
-              <a:t>8/21/2021</a:t>
+              <a:t>8/25/21</a:t>
             </a:fld>
             <a:endParaRPr lang="en-US"/>
           </a:p>
@@ -2423,7 +2423,7 @@
           <a:p>
             <a:fld id="{2FB3C44F-EB7A-4362-988F-8582F7B005A5}" type="datetime1">
               <a:rPr lang="en-US" smtClean="0"/>
-              <a:t>8/21/2021</a:t>
+              <a:t>8/25/21</a:t>
             </a:fld>
             <a:endParaRPr lang="en-US"/>
           </a:p>
@@ -2787,7 +2787,7 @@
           <a:p>
             <a:fld id="{562FC050-B178-415B-A6AA-3CB930AD7BC4}" type="datetime1">
               <a:rPr lang="en-US" smtClean="0"/>
-              <a:t>8/21/2021</a:t>
+              <a:t>8/25/21</a:t>
             </a:fld>
             <a:endParaRPr lang="en-US"/>
           </a:p>
@@ -2904,7 +2904,7 @@
           <a:p>
             <a:fld id="{57132D86-74F1-4A90-8238-488708AA350E}" type="datetime1">
               <a:rPr lang="en-US" smtClean="0"/>
-              <a:t>8/21/2021</a:t>
+              <a:t>8/25/21</a:t>
             </a:fld>
             <a:endParaRPr lang="en-US"/>
           </a:p>
@@ -2999,7 +2999,7 @@
           <a:p>
             <a:fld id="{043B8BFB-6CC9-4563-A926-F31B6C1E86F7}" type="datetime1">
               <a:rPr lang="en-US" smtClean="0"/>
-              <a:t>8/21/2021</a:t>
+              <a:t>8/25/21</a:t>
             </a:fld>
             <a:endParaRPr lang="en-US"/>
           </a:p>
@@ -3274,7 +3274,7 @@
           <a:p>
             <a:fld id="{F59494E5-1AA4-472D-8937-8397B46133DD}" type="datetime1">
               <a:rPr lang="en-US" smtClean="0"/>
-              <a:t>8/21/2021</a:t>
+              <a:t>8/25/21</a:t>
             </a:fld>
             <a:endParaRPr lang="en-US"/>
           </a:p>
@@ -3526,7 +3526,7 @@
           <a:p>
             <a:fld id="{7D587C9B-732A-49D8-8D5E-E18886ACB492}" type="datetime1">
               <a:rPr lang="en-US" smtClean="0"/>
-              <a:t>8/21/2021</a:t>
+              <a:t>8/25/21</a:t>
             </a:fld>
             <a:endParaRPr lang="en-US"/>
           </a:p>
@@ -3737,7 +3737,7 @@
           <a:p>
             <a:fld id="{A865F2EC-BA76-4936-979F-B1C3EC30C83B}" type="datetime1">
               <a:rPr lang="en-US" smtClean="0"/>
-              <a:t>8/21/2021</a:t>
+              <a:t>8/25/21</a:t>
             </a:fld>
             <a:endParaRPr lang="en-US"/>
           </a:p>
@@ -4159,11 +4159,11 @@
           <a:lstStyle/>
           <a:p>
             <a:r>
-              <a:rPr lang="en-US">
+              <a:rPr lang="en-US" dirty="0">
                 <a:latin typeface="Arial" panose="020B0604020202020204" pitchFamily="34" charset="0"/>
                 <a:cs typeface="Arial" panose="020B0604020202020204" pitchFamily="34" charset="0"/>
               </a:rPr>
-              <a:t>Importing Datasets</a:t>
+              <a:t>Introduction to Pandas</a:t>
             </a:r>
           </a:p>
         </p:txBody>
@@ -8795,13 +8795,27 @@
               <a:buNone/>
             </a:pPr>
             <a:r>
-              <a:rPr lang="en-US">
+              <a:rPr lang="en-US" dirty="0">
                 <a:latin typeface="Arial"/>
                 <a:cs typeface="Arial"/>
               </a:rPr>
-              <a:t>We can sort the dataframe by an axis, either 0 or 1</a:t>
-            </a:r>
-            <a:endParaRPr lang="en-US"/>
+              <a:t>We can sort the </a:t>
+            </a:r>
+            <a:r>
+              <a:rPr lang="en-US" dirty="0" err="1">
+                <a:latin typeface="Arial"/>
+                <a:cs typeface="Arial"/>
+              </a:rPr>
+              <a:t>dataframe</a:t>
+            </a:r>
+            <a:r>
+              <a:rPr lang="en-US" dirty="0">
+                <a:latin typeface="Arial"/>
+                <a:cs typeface="Arial"/>
+              </a:rPr>
+              <a:t> by an axis, either 0 or 1</a:t>
+            </a:r>
+            <a:endParaRPr lang="en-US" dirty="0"/>
           </a:p>
           <a:p>
             <a:pPr marL="0" indent="0">
@@ -8859,16 +8873,12 @@
               </a:rPr>
             </a:br>
             <a:r>
-              <a:rPr lang="en-US">
+              <a:rPr lang="en-US" dirty="0">
                 <a:latin typeface="Arial"/>
                 <a:cs typeface="Arial"/>
               </a:rPr>
               <a:t>We can sort them too by a specific value of a column like the following example:</a:t>
             </a:r>
-            <a:endParaRPr lang="en-US" dirty="0">
-              <a:latin typeface="Arial"/>
-              <a:cs typeface="Arial"/>
-            </a:endParaRPr>
           </a:p>
           <a:p>
             <a:pPr marL="0" indent="0">
@@ -8880,7 +8890,7 @@
                 <a:cs typeface="Arial"/>
               </a:rPr>
             </a:br>
-            <a:endParaRPr lang="en-US">
+            <a:endParaRPr lang="en-US" dirty="0">
               <a:latin typeface="Arial"/>
               <a:cs typeface="Arial"/>
             </a:endParaRPr>
@@ -8904,7 +8914,7 @@
                 <a:cs typeface="Arial"/>
               </a:rPr>
             </a:br>
-            <a:endParaRPr lang="en-US"/>
+            <a:endParaRPr lang="en-US" dirty="0"/>
           </a:p>
         </p:txBody>
       </p:sp>
@@ -8971,27 +8981,34 @@
           <a:lstStyle/>
           <a:p>
             <a:r>
-              <a:rPr lang="en-US" sz="1400" b="1">
-                <a:latin typeface="Courier New"/>
-                <a:cs typeface="Courier New"/>
-              </a:rPr>
-              <a:t>Ex: print(df.sort_index(axis=1, ascending=False))</a:t>
-            </a:r>
-          </a:p>
-          <a:p>
-            <a:r>
               <a:rPr lang="en-US" sz="1400" b="1" dirty="0">
                 <a:latin typeface="Courier New"/>
                 <a:cs typeface="Courier New"/>
               </a:rPr>
-              <a:t>   </a:t>
-            </a:r>
-            <a:r>
-              <a:rPr lang="en-US" sz="1400" b="1">
+              <a:t>Ex: print(</a:t>
+            </a:r>
+            <a:r>
+              <a:rPr lang="en-US" sz="1400" b="1" dirty="0" err="1">
                 <a:latin typeface="Courier New"/>
                 <a:cs typeface="Courier New"/>
               </a:rPr>
-              <a:t> &gt;&gt;&gt;</a:t>
+              <a:t>df.sort_index</a:t>
+            </a:r>
+            <a:r>
+              <a:rPr lang="en-US" sz="1400" b="1" dirty="0">
+                <a:latin typeface="Courier New"/>
+                <a:cs typeface="Courier New"/>
+              </a:rPr>
+              <a:t>(axis=1, ascending=False))</a:t>
+            </a:r>
+          </a:p>
+          <a:p>
+            <a:r>
+              <a:rPr lang="en-US" sz="1400" b="1" dirty="0">
+                <a:latin typeface="Courier New"/>
+                <a:cs typeface="Courier New"/>
+              </a:rPr>
+              <a:t>    &gt;&gt;&gt;</a:t>
             </a:r>
           </a:p>
           <a:p>
@@ -9013,7 +9030,7 @@
             </a:endParaRPr>
           </a:p>
           <a:p>
-            <a:endParaRPr lang="en-US">
+            <a:endParaRPr lang="en-US" dirty="0">
               <a:cs typeface="Calibri"/>
             </a:endParaRPr>
           </a:p>
@@ -9088,46 +9105,34 @@
           <a:lstStyle/>
           <a:p>
             <a:r>
-              <a:rPr lang="en-US" sz="1400" b="1">
-                <a:latin typeface="Courier New"/>
-                <a:cs typeface="Courier New"/>
-              </a:rPr>
-              <a:t>Ex: print(</a:t>
-            </a:r>
-            <a:r>
-              <a:rPr lang="en-US" sz="1400">
-                <a:ea typeface="+mn-lt"/>
-                <a:cs typeface="+mn-lt"/>
-              </a:rPr>
-              <a:t>df.sort_values(by='Age')</a:t>
-            </a:r>
-            <a:r>
-              <a:rPr lang="en-US" sz="1400" b="1">
-                <a:latin typeface="Courier New"/>
-                <a:ea typeface="+mn-lt"/>
-                <a:cs typeface="Courier New"/>
-              </a:rPr>
-              <a:t>)</a:t>
-            </a:r>
-            <a:endParaRPr lang="en-US" sz="1400" b="1">
-              <a:latin typeface="Courier New" panose="02070309020205020404" pitchFamily="49" charset="0"/>
-              <a:cs typeface="Courier New" panose="02070309020205020404" pitchFamily="49" charset="0"/>
-            </a:endParaRPr>
-          </a:p>
-          <a:p>
-            <a:r>
               <a:rPr lang="en-US" sz="1400" b="1" dirty="0">
                 <a:latin typeface="Courier New"/>
                 <a:cs typeface="Courier New"/>
               </a:rPr>
-              <a:t>   </a:t>
-            </a:r>
-            <a:r>
-              <a:rPr lang="en-US" sz="1400" b="1">
+              <a:t>Ex: print(</a:t>
+            </a:r>
+            <a:r>
+              <a:rPr lang="en-US" sz="1400" b="1" dirty="0" err="1">
                 <a:latin typeface="Courier New"/>
                 <a:cs typeface="Courier New"/>
               </a:rPr>
-              <a:t> &gt;&gt;&gt;</a:t>
+              <a:t>df.sort_values</a:t>
+            </a:r>
+            <a:r>
+              <a:rPr lang="en-US" sz="1400" b="1" dirty="0">
+                <a:latin typeface="Courier New"/>
+                <a:cs typeface="Courier New"/>
+              </a:rPr>
+              <a:t>(by='Age'))</a:t>
+            </a:r>
+          </a:p>
+          <a:p>
+            <a:r>
+              <a:rPr lang="en-US" sz="1400" b="1" dirty="0">
+                <a:latin typeface="Courier New"/>
+                <a:cs typeface="Courier New"/>
+              </a:rPr>
+              <a:t>    &gt;&gt;&gt;</a:t>
             </a:r>
           </a:p>
           <a:p>
@@ -9167,7 +9172,7 @@
             </a:endParaRPr>
           </a:p>
           <a:p>
-            <a:endParaRPr lang="en-US">
+            <a:endParaRPr lang="en-US" dirty="0">
               <a:cs typeface="Calibri"/>
             </a:endParaRPr>
           </a:p>

</xml_diff>